<commit_message>
VIP(Check Box) 항목 추가
</commit_message>
<xml_diff>
--- a/Control 사용 방법.pptx
+++ b/Control 사용 방법.pptx
@@ -10,6 +10,7 @@
     <p:sldId id="258" r:id="rId4"/>
     <p:sldId id="259" r:id="rId5"/>
     <p:sldId id="260" r:id="rId6"/>
+    <p:sldId id="261" r:id="rId7"/>
   </p:sldIdLst>
   <p:sldSz cx="12192000" cy="6858000"/>
   <p:notesSz cx="6858000" cy="9144000"/>
@@ -3679,6 +3680,95 @@
 </p:sld>
 </file>
 
+<file path=ppt/slides/slide6.xml><?xml version="1.0" encoding="utf-8"?>
+<p:sld xmlns:a="http://schemas.openxmlformats.org/drawingml/2006/main" xmlns:r="http://schemas.openxmlformats.org/officeDocument/2006/relationships" xmlns:p="http://schemas.openxmlformats.org/presentationml/2006/main">
+  <p:cSld>
+    <p:spTree>
+      <p:nvGrpSpPr>
+        <p:cNvPr id="1" name=""/>
+        <p:cNvGrpSpPr/>
+        <p:nvPr/>
+      </p:nvGrpSpPr>
+      <p:grpSpPr>
+        <a:xfrm>
+          <a:off x="0" y="0"/>
+          <a:ext cx="0" cy="0"/>
+          <a:chOff x="0" y="0"/>
+          <a:chExt cx="0" cy="0"/>
+        </a:xfrm>
+      </p:grpSpPr>
+      <p:sp>
+        <p:nvSpPr>
+          <p:cNvPr id="2" name="제목 1">
+            <a:extLst>
+              <a:ext uri="{FF2B5EF4-FFF2-40B4-BE49-F238E27FC236}">
+                <a16:creationId xmlns:a16="http://schemas.microsoft.com/office/drawing/2014/main" id="{CD10DF46-4D37-E570-0AEE-F722B2A015CB}"/>
+              </a:ext>
+            </a:extLst>
+          </p:cNvPr>
+          <p:cNvSpPr>
+            <a:spLocks noGrp="1"/>
+          </p:cNvSpPr>
+          <p:nvPr>
+            <p:ph type="title"/>
+          </p:nvPr>
+        </p:nvSpPr>
+        <p:spPr/>
+        <p:txBody>
+          <a:bodyPr/>
+          <a:lstStyle/>
+          <a:p>
+            <a:r>
+              <a:rPr lang="en-US" altLang="ko-KR"/>
+              <a:t>Check Box</a:t>
+            </a:r>
+            <a:endParaRPr lang="ko-KR" altLang="en-US"/>
+          </a:p>
+        </p:txBody>
+      </p:sp>
+      <p:pic>
+        <p:nvPicPr>
+          <p:cNvPr id="5" name="그림 4">
+            <a:extLst>
+              <a:ext uri="{FF2B5EF4-FFF2-40B4-BE49-F238E27FC236}">
+                <a16:creationId xmlns:a16="http://schemas.microsoft.com/office/drawing/2014/main" id="{45811258-B76B-19A1-0D00-836BDE4D9D59}"/>
+              </a:ext>
+            </a:extLst>
+          </p:cNvPr>
+          <p:cNvPicPr>
+            <a:picLocks noChangeAspect="1"/>
+          </p:cNvPicPr>
+          <p:nvPr/>
+        </p:nvPicPr>
+        <p:blipFill>
+          <a:blip r:embed="rId2"/>
+          <a:stretch>
+            <a:fillRect/>
+          </a:stretch>
+        </p:blipFill>
+        <p:spPr>
+          <a:xfrm>
+            <a:off x="86134" y="2208472"/>
+            <a:ext cx="12192000" cy="3901440"/>
+          </a:xfrm>
+          <a:prstGeom prst="rect">
+            <a:avLst/>
+          </a:prstGeom>
+        </p:spPr>
+      </p:pic>
+    </p:spTree>
+    <p:extLst>
+      <p:ext uri="{BB962C8B-B14F-4D97-AF65-F5344CB8AC3E}">
+        <p14:creationId xmlns:p14="http://schemas.microsoft.com/office/powerpoint/2010/main" val="2148756554"/>
+      </p:ext>
+    </p:extLst>
+  </p:cSld>
+  <p:clrMapOvr>
+    <a:masterClrMapping/>
+  </p:clrMapOvr>
+</p:sld>
+</file>
+
 <file path=ppt/theme/theme1.xml><?xml version="1.0" encoding="utf-8"?>
 <a:theme xmlns:a="http://schemas.openxmlformats.org/drawingml/2006/main" name="Office 테마">
   <a:themeElements>

</xml_diff>

<commit_message>
성별(Radio Button) 항목 추가
</commit_message>
<xml_diff>
--- a/Control 사용 방법.pptx
+++ b/Control 사용 방법.pptx
@@ -11,6 +11,9 @@
     <p:sldId id="259" r:id="rId5"/>
     <p:sldId id="260" r:id="rId6"/>
     <p:sldId id="261" r:id="rId7"/>
+    <p:sldId id="262" r:id="rId8"/>
+    <p:sldId id="263" r:id="rId9"/>
+    <p:sldId id="264" r:id="rId10"/>
   </p:sldIdLst>
   <p:sldSz cx="12192000" cy="6858000"/>
   <p:notesSz cx="6858000" cy="9144000"/>
@@ -3769,6 +3772,251 @@
 </p:sld>
 </file>
 
+<file path=ppt/slides/slide7.xml><?xml version="1.0" encoding="utf-8"?>
+<p:sld xmlns:a="http://schemas.openxmlformats.org/drawingml/2006/main" xmlns:r="http://schemas.openxmlformats.org/officeDocument/2006/relationships" xmlns:p="http://schemas.openxmlformats.org/presentationml/2006/main">
+  <p:cSld>
+    <p:spTree>
+      <p:nvGrpSpPr>
+        <p:cNvPr id="1" name=""/>
+        <p:cNvGrpSpPr/>
+        <p:nvPr/>
+      </p:nvGrpSpPr>
+      <p:grpSpPr>
+        <a:xfrm>
+          <a:off x="0" y="0"/>
+          <a:ext cx="0" cy="0"/>
+          <a:chOff x="0" y="0"/>
+          <a:chExt cx="0" cy="0"/>
+        </a:xfrm>
+      </p:grpSpPr>
+      <p:sp>
+        <p:nvSpPr>
+          <p:cNvPr id="2" name="제목 1">
+            <a:extLst>
+              <a:ext uri="{FF2B5EF4-FFF2-40B4-BE49-F238E27FC236}">
+                <a16:creationId xmlns:a16="http://schemas.microsoft.com/office/drawing/2014/main" id="{0EAA0309-0AE3-F882-5EC1-04FB7513254A}"/>
+              </a:ext>
+            </a:extLst>
+          </p:cNvPr>
+          <p:cNvSpPr>
+            <a:spLocks noGrp="1"/>
+          </p:cNvSpPr>
+          <p:nvPr>
+            <p:ph type="title"/>
+          </p:nvPr>
+        </p:nvSpPr>
+        <p:spPr/>
+        <p:txBody>
+          <a:bodyPr/>
+          <a:lstStyle/>
+          <a:p>
+            <a:r>
+              <a:rPr lang="ko-KR" altLang="en-US" dirty="0"/>
+              <a:t>탭 순서</a:t>
+            </a:r>
+            <a:r>
+              <a:rPr lang="en-US" altLang="ko-KR" dirty="0"/>
+              <a:t>: </a:t>
+            </a:r>
+            <a:r>
+              <a:rPr lang="en-US" altLang="ko-KR" dirty="0" err="1"/>
+              <a:t>Ctrl+D</a:t>
+            </a:r>
+            <a:endParaRPr lang="ko-KR" altLang="en-US" dirty="0"/>
+          </a:p>
+        </p:txBody>
+      </p:sp>
+      <p:pic>
+        <p:nvPicPr>
+          <p:cNvPr id="5" name="그림 4">
+            <a:extLst>
+              <a:ext uri="{FF2B5EF4-FFF2-40B4-BE49-F238E27FC236}">
+                <a16:creationId xmlns:a16="http://schemas.microsoft.com/office/drawing/2014/main" id="{4584B841-66AD-2E51-2052-EF2EF515BE2E}"/>
+              </a:ext>
+            </a:extLst>
+          </p:cNvPr>
+          <p:cNvPicPr>
+            <a:picLocks noChangeAspect="1"/>
+          </p:cNvPicPr>
+          <p:nvPr/>
+        </p:nvPicPr>
+        <p:blipFill>
+          <a:blip r:embed="rId2"/>
+          <a:stretch>
+            <a:fillRect/>
+          </a:stretch>
+        </p:blipFill>
+        <p:spPr>
+          <a:xfrm>
+            <a:off x="1800668" y="1781076"/>
+            <a:ext cx="7582958" cy="4191585"/>
+          </a:xfrm>
+          <a:prstGeom prst="rect">
+            <a:avLst/>
+          </a:prstGeom>
+        </p:spPr>
+      </p:pic>
+    </p:spTree>
+    <p:extLst>
+      <p:ext uri="{BB962C8B-B14F-4D97-AF65-F5344CB8AC3E}">
+        <p14:creationId xmlns:p14="http://schemas.microsoft.com/office/powerpoint/2010/main" val="3370868383"/>
+      </p:ext>
+    </p:extLst>
+  </p:cSld>
+  <p:clrMapOvr>
+    <a:masterClrMapping/>
+  </p:clrMapOvr>
+</p:sld>
+</file>
+
+<file path=ppt/slides/slide8.xml><?xml version="1.0" encoding="utf-8"?>
+<p:sld xmlns:a="http://schemas.openxmlformats.org/drawingml/2006/main" xmlns:r="http://schemas.openxmlformats.org/officeDocument/2006/relationships" xmlns:p="http://schemas.openxmlformats.org/presentationml/2006/main">
+  <p:cSld>
+    <p:spTree>
+      <p:nvGrpSpPr>
+        <p:cNvPr id="1" name=""/>
+        <p:cNvGrpSpPr/>
+        <p:nvPr/>
+      </p:nvGrpSpPr>
+      <p:grpSpPr>
+        <a:xfrm>
+          <a:off x="0" y="0"/>
+          <a:ext cx="0" cy="0"/>
+          <a:chOff x="0" y="0"/>
+          <a:chExt cx="0" cy="0"/>
+        </a:xfrm>
+      </p:grpSpPr>
+      <p:sp>
+        <p:nvSpPr>
+          <p:cNvPr id="2" name="제목 1">
+            <a:extLst>
+              <a:ext uri="{FF2B5EF4-FFF2-40B4-BE49-F238E27FC236}">
+                <a16:creationId xmlns:a16="http://schemas.microsoft.com/office/drawing/2014/main" id="{496F0543-DD7C-6C20-2AE5-A33BD042166C}"/>
+              </a:ext>
+            </a:extLst>
+          </p:cNvPr>
+          <p:cNvSpPr>
+            <a:spLocks noGrp="1"/>
+          </p:cNvSpPr>
+          <p:nvPr>
+            <p:ph type="title"/>
+          </p:nvPr>
+        </p:nvSpPr>
+        <p:spPr/>
+        <p:txBody>
+          <a:bodyPr/>
+          <a:lstStyle/>
+          <a:p>
+            <a:r>
+              <a:rPr lang="ko-KR" altLang="en-US" dirty="0"/>
+              <a:t>성별 추가</a:t>
+            </a:r>
+          </a:p>
+        </p:txBody>
+      </p:sp>
+      <p:pic>
+        <p:nvPicPr>
+          <p:cNvPr id="5" name="그림 4">
+            <a:extLst>
+              <a:ext uri="{FF2B5EF4-FFF2-40B4-BE49-F238E27FC236}">
+                <a16:creationId xmlns:a16="http://schemas.microsoft.com/office/drawing/2014/main" id="{0D4F3D58-DCAC-58B8-4D9D-EB726A122422}"/>
+              </a:ext>
+            </a:extLst>
+          </p:cNvPr>
+          <p:cNvPicPr>
+            <a:picLocks noChangeAspect="1"/>
+          </p:cNvPicPr>
+          <p:nvPr/>
+        </p:nvPicPr>
+        <p:blipFill>
+          <a:blip r:embed="rId2"/>
+          <a:stretch>
+            <a:fillRect/>
+          </a:stretch>
+        </p:blipFill>
+        <p:spPr>
+          <a:xfrm>
+            <a:off x="889861" y="1312650"/>
+            <a:ext cx="8515396" cy="5445802"/>
+          </a:xfrm>
+          <a:prstGeom prst="rect">
+            <a:avLst/>
+          </a:prstGeom>
+        </p:spPr>
+      </p:pic>
+    </p:spTree>
+    <p:extLst>
+      <p:ext uri="{BB962C8B-B14F-4D97-AF65-F5344CB8AC3E}">
+        <p14:creationId xmlns:p14="http://schemas.microsoft.com/office/powerpoint/2010/main" val="2269490919"/>
+      </p:ext>
+    </p:extLst>
+  </p:cSld>
+  <p:clrMapOvr>
+    <a:masterClrMapping/>
+  </p:clrMapOvr>
+</p:sld>
+</file>
+
+<file path=ppt/slides/slide9.xml><?xml version="1.0" encoding="utf-8"?>
+<p:sld xmlns:a="http://schemas.openxmlformats.org/drawingml/2006/main" xmlns:r="http://schemas.openxmlformats.org/officeDocument/2006/relationships" xmlns:p="http://schemas.openxmlformats.org/presentationml/2006/main">
+  <p:cSld>
+    <p:spTree>
+      <p:nvGrpSpPr>
+        <p:cNvPr id="1" name=""/>
+        <p:cNvGrpSpPr/>
+        <p:nvPr/>
+      </p:nvGrpSpPr>
+      <p:grpSpPr>
+        <a:xfrm>
+          <a:off x="0" y="0"/>
+          <a:ext cx="0" cy="0"/>
+          <a:chOff x="0" y="0"/>
+          <a:chExt cx="0" cy="0"/>
+        </a:xfrm>
+      </p:grpSpPr>
+      <p:pic>
+        <p:nvPicPr>
+          <p:cNvPr id="5" name="그림 4">
+            <a:extLst>
+              <a:ext uri="{FF2B5EF4-FFF2-40B4-BE49-F238E27FC236}">
+                <a16:creationId xmlns:a16="http://schemas.microsoft.com/office/drawing/2014/main" id="{4CDCE0BB-38C0-0518-7199-C013D60E832C}"/>
+              </a:ext>
+            </a:extLst>
+          </p:cNvPr>
+          <p:cNvPicPr>
+            <a:picLocks noChangeAspect="1"/>
+          </p:cNvPicPr>
+          <p:nvPr/>
+        </p:nvPicPr>
+        <p:blipFill>
+          <a:blip r:embed="rId2"/>
+          <a:stretch>
+            <a:fillRect/>
+          </a:stretch>
+        </p:blipFill>
+        <p:spPr>
+          <a:xfrm>
+            <a:off x="0" y="1496299"/>
+            <a:ext cx="12192000" cy="3865401"/>
+          </a:xfrm>
+          <a:prstGeom prst="rect">
+            <a:avLst/>
+          </a:prstGeom>
+        </p:spPr>
+      </p:pic>
+    </p:spTree>
+    <p:extLst>
+      <p:ext uri="{BB962C8B-B14F-4D97-AF65-F5344CB8AC3E}">
+        <p14:creationId xmlns:p14="http://schemas.microsoft.com/office/powerpoint/2010/main" val="323692970"/>
+      </p:ext>
+    </p:extLst>
+  </p:cSld>
+  <p:clrMapOvr>
+    <a:masterClrMapping/>
+  </p:clrMapOvr>
+</p:sld>
+</file>
+
 <file path=ppt/theme/theme1.xml><?xml version="1.0" encoding="utf-8"?>
 <a:theme xmlns:a="http://schemas.openxmlformats.org/drawingml/2006/main" name="Office 테마">
   <a:themeElements>

</xml_diff>

<commit_message>
MBTI(Combo Box) 항목 추가
</commit_message>
<xml_diff>
--- a/Control 사용 방법.pptx
+++ b/Control 사용 방법.pptx
@@ -14,6 +14,9 @@
     <p:sldId id="262" r:id="rId8"/>
     <p:sldId id="263" r:id="rId9"/>
     <p:sldId id="264" r:id="rId10"/>
+    <p:sldId id="265" r:id="rId11"/>
+    <p:sldId id="266" r:id="rId12"/>
+    <p:sldId id="267" r:id="rId13"/>
   </p:sldIdLst>
   <p:sldSz cx="12192000" cy="6858000"/>
   <p:notesSz cx="6858000" cy="9144000"/>
@@ -3368,6 +3371,276 @@
     <p:extLst>
       <p:ext uri="{BB962C8B-B14F-4D97-AF65-F5344CB8AC3E}">
         <p14:creationId xmlns:p14="http://schemas.microsoft.com/office/powerpoint/2010/main" val="2094058278"/>
+      </p:ext>
+    </p:extLst>
+  </p:cSld>
+  <p:clrMapOvr>
+    <a:masterClrMapping/>
+  </p:clrMapOvr>
+</p:sld>
+</file>
+
+<file path=ppt/slides/slide10.xml><?xml version="1.0" encoding="utf-8"?>
+<p:sld xmlns:a="http://schemas.openxmlformats.org/drawingml/2006/main" xmlns:r="http://schemas.openxmlformats.org/officeDocument/2006/relationships" xmlns:p="http://schemas.openxmlformats.org/presentationml/2006/main">
+  <p:cSld>
+    <p:spTree>
+      <p:nvGrpSpPr>
+        <p:cNvPr id="1" name=""/>
+        <p:cNvGrpSpPr/>
+        <p:nvPr/>
+      </p:nvGrpSpPr>
+      <p:grpSpPr>
+        <a:xfrm>
+          <a:off x="0" y="0"/>
+          <a:ext cx="0" cy="0"/>
+          <a:chOff x="0" y="0"/>
+          <a:chExt cx="0" cy="0"/>
+        </a:xfrm>
+      </p:grpSpPr>
+      <p:sp>
+        <p:nvSpPr>
+          <p:cNvPr id="2" name="제목 1">
+            <a:extLst>
+              <a:ext uri="{FF2B5EF4-FFF2-40B4-BE49-F238E27FC236}">
+                <a16:creationId xmlns:a16="http://schemas.microsoft.com/office/drawing/2014/main" id="{B204A2E5-8CE1-1B36-9BCC-96374485D6ED}"/>
+              </a:ext>
+            </a:extLst>
+          </p:cNvPr>
+          <p:cNvSpPr>
+            <a:spLocks noGrp="1"/>
+          </p:cNvSpPr>
+          <p:nvPr>
+            <p:ph type="title"/>
+          </p:nvPr>
+        </p:nvSpPr>
+        <p:spPr/>
+        <p:txBody>
+          <a:bodyPr/>
+          <a:lstStyle/>
+          <a:p>
+            <a:r>
+              <a:rPr lang="ko-KR" altLang="en-US" dirty="0"/>
+              <a:t>비트맵 추가</a:t>
+            </a:r>
+          </a:p>
+        </p:txBody>
+      </p:sp>
+      <p:pic>
+        <p:nvPicPr>
+          <p:cNvPr id="5" name="그림 4">
+            <a:extLst>
+              <a:ext uri="{FF2B5EF4-FFF2-40B4-BE49-F238E27FC236}">
+                <a16:creationId xmlns:a16="http://schemas.microsoft.com/office/drawing/2014/main" id="{3210B7F5-ACF8-0030-D14E-4C137859F816}"/>
+              </a:ext>
+            </a:extLst>
+          </p:cNvPr>
+          <p:cNvPicPr>
+            <a:picLocks noChangeAspect="1"/>
+          </p:cNvPicPr>
+          <p:nvPr/>
+        </p:nvPicPr>
+        <p:blipFill>
+          <a:blip r:embed="rId2"/>
+          <a:stretch>
+            <a:fillRect/>
+          </a:stretch>
+        </p:blipFill>
+        <p:spPr>
+          <a:xfrm>
+            <a:off x="411156" y="1764134"/>
+            <a:ext cx="4734586" cy="4505954"/>
+          </a:xfrm>
+          <a:prstGeom prst="rect">
+            <a:avLst/>
+          </a:prstGeom>
+        </p:spPr>
+      </p:pic>
+      <p:pic>
+        <p:nvPicPr>
+          <p:cNvPr id="7" name="그림 6">
+            <a:extLst>
+              <a:ext uri="{FF2B5EF4-FFF2-40B4-BE49-F238E27FC236}">
+                <a16:creationId xmlns:a16="http://schemas.microsoft.com/office/drawing/2014/main" id="{66FC23BC-2E10-0850-93CA-13A2FCF65071}"/>
+              </a:ext>
+            </a:extLst>
+          </p:cNvPr>
+          <p:cNvPicPr>
+            <a:picLocks noChangeAspect="1"/>
+          </p:cNvPicPr>
+          <p:nvPr/>
+        </p:nvPicPr>
+        <p:blipFill>
+          <a:blip r:embed="rId3"/>
+          <a:stretch>
+            <a:fillRect/>
+          </a:stretch>
+        </p:blipFill>
+        <p:spPr>
+          <a:xfrm>
+            <a:off x="5955136" y="1668871"/>
+            <a:ext cx="5992061" cy="4601217"/>
+          </a:xfrm>
+          <a:prstGeom prst="rect">
+            <a:avLst/>
+          </a:prstGeom>
+        </p:spPr>
+      </p:pic>
+    </p:spTree>
+    <p:extLst>
+      <p:ext uri="{BB962C8B-B14F-4D97-AF65-F5344CB8AC3E}">
+        <p14:creationId xmlns:p14="http://schemas.microsoft.com/office/powerpoint/2010/main" val="4232342377"/>
+      </p:ext>
+    </p:extLst>
+  </p:cSld>
+  <p:clrMapOvr>
+    <a:masterClrMapping/>
+  </p:clrMapOvr>
+</p:sld>
+</file>
+
+<file path=ppt/slides/slide11.xml><?xml version="1.0" encoding="utf-8"?>
+<p:sld xmlns:a="http://schemas.openxmlformats.org/drawingml/2006/main" xmlns:r="http://schemas.openxmlformats.org/officeDocument/2006/relationships" xmlns:p="http://schemas.openxmlformats.org/presentationml/2006/main">
+  <p:cSld>
+    <p:spTree>
+      <p:nvGrpSpPr>
+        <p:cNvPr id="1" name=""/>
+        <p:cNvGrpSpPr/>
+        <p:nvPr/>
+      </p:nvGrpSpPr>
+      <p:grpSpPr>
+        <a:xfrm>
+          <a:off x="0" y="0"/>
+          <a:ext cx="0" cy="0"/>
+          <a:chOff x="0" y="0"/>
+          <a:chExt cx="0" cy="0"/>
+        </a:xfrm>
+      </p:grpSpPr>
+      <p:pic>
+        <p:nvPicPr>
+          <p:cNvPr id="5" name="그림 4">
+            <a:extLst>
+              <a:ext uri="{FF2B5EF4-FFF2-40B4-BE49-F238E27FC236}">
+                <a16:creationId xmlns:a16="http://schemas.microsoft.com/office/drawing/2014/main" id="{63543ABC-B69D-4F47-C9C5-DA56449963C2}"/>
+              </a:ext>
+            </a:extLst>
+          </p:cNvPr>
+          <p:cNvPicPr>
+            <a:picLocks noChangeAspect="1"/>
+          </p:cNvPicPr>
+          <p:nvPr/>
+        </p:nvPicPr>
+        <p:blipFill>
+          <a:blip r:embed="rId2"/>
+          <a:stretch>
+            <a:fillRect/>
+          </a:stretch>
+        </p:blipFill>
+        <p:spPr>
+          <a:xfrm>
+            <a:off x="0" y="1127713"/>
+            <a:ext cx="12192000" cy="4602573"/>
+          </a:xfrm>
+          <a:prstGeom prst="rect">
+            <a:avLst/>
+          </a:prstGeom>
+        </p:spPr>
+      </p:pic>
+    </p:spTree>
+    <p:extLst>
+      <p:ext uri="{BB962C8B-B14F-4D97-AF65-F5344CB8AC3E}">
+        <p14:creationId xmlns:p14="http://schemas.microsoft.com/office/powerpoint/2010/main" val="850264846"/>
+      </p:ext>
+    </p:extLst>
+  </p:cSld>
+  <p:clrMapOvr>
+    <a:masterClrMapping/>
+  </p:clrMapOvr>
+</p:sld>
+</file>
+
+<file path=ppt/slides/slide12.xml><?xml version="1.0" encoding="utf-8"?>
+<p:sld xmlns:a="http://schemas.openxmlformats.org/drawingml/2006/main" xmlns:r="http://schemas.openxmlformats.org/officeDocument/2006/relationships" xmlns:p="http://schemas.openxmlformats.org/presentationml/2006/main">
+  <p:cSld>
+    <p:spTree>
+      <p:nvGrpSpPr>
+        <p:cNvPr id="1" name=""/>
+        <p:cNvGrpSpPr/>
+        <p:nvPr/>
+      </p:nvGrpSpPr>
+      <p:grpSpPr>
+        <a:xfrm>
+          <a:off x="0" y="0"/>
+          <a:ext cx="0" cy="0"/>
+          <a:chOff x="0" y="0"/>
+          <a:chExt cx="0" cy="0"/>
+        </a:xfrm>
+      </p:grpSpPr>
+      <p:sp>
+        <p:nvSpPr>
+          <p:cNvPr id="2" name="제목 1">
+            <a:extLst>
+              <a:ext uri="{FF2B5EF4-FFF2-40B4-BE49-F238E27FC236}">
+                <a16:creationId xmlns:a16="http://schemas.microsoft.com/office/drawing/2014/main" id="{F0C59904-DD78-B892-D771-B9CC38908C2A}"/>
+              </a:ext>
+            </a:extLst>
+          </p:cNvPr>
+          <p:cNvSpPr>
+            <a:spLocks noGrp="1"/>
+          </p:cNvSpPr>
+          <p:nvPr>
+            <p:ph type="title"/>
+          </p:nvPr>
+        </p:nvSpPr>
+        <p:spPr/>
+        <p:txBody>
+          <a:bodyPr/>
+          <a:lstStyle/>
+          <a:p>
+            <a:r>
+              <a:rPr lang="en-US" altLang="ko-KR" dirty="0"/>
+              <a:t>Combo Box </a:t>
+            </a:r>
+            <a:r>
+              <a:rPr lang="ko-KR" altLang="en-US" dirty="0"/>
+              <a:t>설정</a:t>
+            </a:r>
+          </a:p>
+        </p:txBody>
+      </p:sp>
+      <p:pic>
+        <p:nvPicPr>
+          <p:cNvPr id="5" name="그림 4">
+            <a:extLst>
+              <a:ext uri="{FF2B5EF4-FFF2-40B4-BE49-F238E27FC236}">
+                <a16:creationId xmlns:a16="http://schemas.microsoft.com/office/drawing/2014/main" id="{CD8BA68A-581E-8D3A-E25E-64E5EC98596F}"/>
+              </a:ext>
+            </a:extLst>
+          </p:cNvPr>
+          <p:cNvPicPr>
+            <a:picLocks noChangeAspect="1"/>
+          </p:cNvPicPr>
+          <p:nvPr/>
+        </p:nvPicPr>
+        <p:blipFill>
+          <a:blip r:embed="rId2"/>
+          <a:stretch>
+            <a:fillRect/>
+          </a:stretch>
+        </p:blipFill>
+        <p:spPr>
+          <a:xfrm>
+            <a:off x="0" y="1374552"/>
+            <a:ext cx="12192000" cy="5483448"/>
+          </a:xfrm>
+          <a:prstGeom prst="rect">
+            <a:avLst/>
+          </a:prstGeom>
+        </p:spPr>
+      </p:pic>
+    </p:spTree>
+    <p:extLst>
+      <p:ext uri="{BB962C8B-B14F-4D97-AF65-F5344CB8AC3E}">
+        <p14:creationId xmlns:p14="http://schemas.microsoft.com/office/powerpoint/2010/main" val="1487396184"/>
       </p:ext>
     </p:extLst>
   </p:cSld>

</xml_diff>